<commit_message>
Settled on the curvy diagram version
</commit_message>
<xml_diff>
--- a/devdoc/img_src/tlsio_state_diagram.pptx
+++ b/devdoc/img_src/tlsio_state_diagram.pptx
@@ -3533,43 +3533,13 @@
       </p:grpSpPr>
       <p:sp>
         <p:nvSpPr>
-          <p:cNvPr id="151" name="TextBox 150"/>
-          <p:cNvSpPr txBox="1"/>
-          <p:nvPr/>
-        </p:nvSpPr>
-        <p:spPr>
-          <a:xfrm>
-            <a:off x="3685561" y="3135162"/>
-            <a:ext cx="957970" cy="293838"/>
-          </a:xfrm>
-          <a:prstGeom prst="rect">
-            <a:avLst/>
-          </a:prstGeom>
-          <a:noFill/>
-        </p:spPr>
-        <p:txBody>
-          <a:bodyPr wrap="none" lIns="138596" tIns="69298" rIns="138596" bIns="69298" rtlCol="0">
-            <a:spAutoFit/>
-          </a:bodyPr>
-          <a:lstStyle/>
-          <a:p>
-            <a:r>
-              <a:rPr lang="en-US" sz="1000" dirty="0" err="1"/>
-              <a:t>tlsio_dowork</a:t>
-            </a:r>
-            <a:endParaRPr lang="en-US" sz="1000" dirty="0"/>
-          </a:p>
-        </p:txBody>
-      </p:sp>
-      <p:sp>
-        <p:nvSpPr>
           <p:cNvPr id="119" name="TextBox 118"/>
           <p:cNvSpPr txBox="1"/>
           <p:nvPr/>
         </p:nvSpPr>
         <p:spPr>
           <a:xfrm>
-            <a:off x="2048823" y="3768571"/>
+            <a:off x="2048823" y="3886200"/>
             <a:ext cx="1494785" cy="416948"/>
           </a:xfrm>
           <a:prstGeom prst="rect">
@@ -3831,39 +3801,6 @@
           </a:prstGeom>
           <a:ln w="19050">
             <a:prstDash val="sysDash"/>
-            <a:tailEnd type="triangle"/>
-          </a:ln>
-        </p:spPr>
-        <p:style>
-          <a:lnRef idx="1">
-            <a:schemeClr val="accent1"/>
-          </a:lnRef>
-          <a:fillRef idx="0">
-            <a:schemeClr val="accent1"/>
-          </a:fillRef>
-          <a:effectRef idx="0">
-            <a:schemeClr val="accent1"/>
-          </a:effectRef>
-          <a:fontRef idx="minor">
-            <a:schemeClr val="tx1"/>
-          </a:fontRef>
-        </p:style>
-      </p:cxnSp>
-      <p:cxnSp>
-        <p:nvCxnSpPr>
-          <p:cNvPr id="127" name="Straight Arrow Connector 126"/>
-          <p:cNvCxnSpPr/>
-          <p:nvPr/>
-        </p:nvCxnSpPr>
-        <p:spPr>
-          <a:xfrm>
-            <a:off x="1949292" y="1524000"/>
-            <a:ext cx="1604109" cy="0"/>
-          </a:xfrm>
-          <a:prstGeom prst="straightConnector1">
-            <a:avLst/>
-          </a:prstGeom>
-          <a:ln w="19050">
             <a:tailEnd type="triangle"/>
           </a:ln>
         </p:spPr>
@@ -3998,7 +3935,7 @@
         </p:nvCxnSpPr>
         <p:spPr>
           <a:xfrm flipV="1">
-            <a:off x="6486962" y="605036"/>
+            <a:off x="6593642" y="624851"/>
             <a:ext cx="457200" cy="0"/>
           </a:xfrm>
           <a:prstGeom prst="straightConnector1">
@@ -4034,7 +3971,7 @@
         </p:nvSpPr>
         <p:spPr>
           <a:xfrm>
-            <a:off x="4648200" y="437385"/>
+            <a:off x="4754880" y="457200"/>
             <a:ext cx="1817308" cy="324615"/>
           </a:xfrm>
           <a:prstGeom prst="rect">
@@ -4048,6 +3985,7 @@
           </a:bodyPr>
           <a:lstStyle/>
           <a:p>
+            <a:pPr algn="r"/>
             <a:r>
               <a:rPr lang="en-US" sz="1200" dirty="0"/>
               <a:t>failed </a:t>
@@ -4071,49 +4009,16 @@
           </a:p>
         </p:txBody>
       </p:sp>
-      <p:cxnSp>
-        <p:nvCxnSpPr>
-          <p:cNvPr id="133" name="Straight Arrow Connector 132"/>
-          <p:cNvCxnSpPr/>
-          <p:nvPr/>
-        </p:nvCxnSpPr>
-        <p:spPr>
-          <a:xfrm flipV="1">
-            <a:off x="6478081" y="152525"/>
-            <a:ext cx="457200" cy="0"/>
-          </a:xfrm>
-          <a:prstGeom prst="straightConnector1">
-            <a:avLst/>
-          </a:prstGeom>
-          <a:ln w="19050">
-            <a:tailEnd type="triangle"/>
-          </a:ln>
-        </p:spPr>
-        <p:style>
-          <a:lnRef idx="1">
-            <a:schemeClr val="accent1"/>
-          </a:lnRef>
-          <a:fillRef idx="0">
-            <a:schemeClr val="accent1"/>
-          </a:fillRef>
-          <a:effectRef idx="0">
-            <a:schemeClr val="accent1"/>
-          </a:effectRef>
-          <a:fontRef idx="minor">
-            <a:schemeClr val="tx1"/>
-          </a:fontRef>
-        </p:style>
-      </p:cxnSp>
-      <p:sp>
-        <p:nvSpPr>
-          <p:cNvPr id="134" name="TextBox 133"/>
+      <p:sp>
+        <p:nvSpPr>
+          <p:cNvPr id="135" name="TextBox 134"/>
           <p:cNvSpPr txBox="1"/>
           <p:nvPr/>
         </p:nvSpPr>
         <p:spPr>
           <a:xfrm>
-            <a:off x="5267764" y="-19815"/>
-            <a:ext cx="1216566" cy="324615"/>
+            <a:off x="4594321" y="1158871"/>
+            <a:ext cx="1182390" cy="293838"/>
           </a:xfrm>
           <a:prstGeom prst="rect">
             <a:avLst/>
@@ -4127,97 +4032,8 @@
           <a:lstStyle/>
           <a:p>
             <a:r>
-              <a:rPr lang="en-US" sz="1200" dirty="0"/>
-              <a:t>successful calls</a:t>
-            </a:r>
-          </a:p>
-        </p:txBody>
-      </p:sp>
-      <p:sp>
-        <p:nvSpPr>
-          <p:cNvPr id="135" name="TextBox 134"/>
-          <p:cNvSpPr txBox="1"/>
-          <p:nvPr/>
-        </p:nvSpPr>
-        <p:spPr>
-          <a:xfrm>
-            <a:off x="4594321" y="1158871"/>
-            <a:ext cx="1182390" cy="293838"/>
-          </a:xfrm>
-          <a:prstGeom prst="rect">
-            <a:avLst/>
-          </a:prstGeom>
-          <a:noFill/>
-        </p:spPr>
-        <p:txBody>
-          <a:bodyPr wrap="none" lIns="138596" tIns="69298" rIns="138596" bIns="69298" rtlCol="0">
-            <a:spAutoFit/>
-          </a:bodyPr>
-          <a:lstStyle/>
-          <a:p>
-            <a:r>
               <a:rPr lang="en-US" sz="1000" dirty="0" err="1" smtClean="0"/>
               <a:t>tlsio_open_async</a:t>
-            </a:r>
-            <a:endParaRPr lang="en-US" sz="1000" dirty="0"/>
-          </a:p>
-        </p:txBody>
-      </p:sp>
-      <p:sp>
-        <p:nvSpPr>
-          <p:cNvPr id="137" name="TextBox 136"/>
-          <p:cNvSpPr txBox="1"/>
-          <p:nvPr/>
-        </p:nvSpPr>
-        <p:spPr>
-          <a:xfrm>
-            <a:off x="4774873" y="4140909"/>
-            <a:ext cx="957970" cy="293838"/>
-          </a:xfrm>
-          <a:prstGeom prst="rect">
-            <a:avLst/>
-          </a:prstGeom>
-          <a:noFill/>
-        </p:spPr>
-        <p:txBody>
-          <a:bodyPr wrap="none" lIns="138596" tIns="69298" rIns="138596" bIns="69298" rtlCol="0">
-            <a:spAutoFit/>
-          </a:bodyPr>
-          <a:lstStyle/>
-          <a:p>
-            <a:r>
-              <a:rPr lang="en-US" sz="1000" dirty="0" err="1"/>
-              <a:t>tlsio_dowork</a:t>
-            </a:r>
-            <a:endParaRPr lang="en-US" sz="1000" dirty="0"/>
-          </a:p>
-        </p:txBody>
-      </p:sp>
-      <p:sp>
-        <p:nvSpPr>
-          <p:cNvPr id="138" name="TextBox 137"/>
-          <p:cNvSpPr txBox="1"/>
-          <p:nvPr/>
-        </p:nvSpPr>
-        <p:spPr>
-          <a:xfrm>
-            <a:off x="2209800" y="4038600"/>
-            <a:ext cx="1180787" cy="293838"/>
-          </a:xfrm>
-          <a:prstGeom prst="rect">
-            <a:avLst/>
-          </a:prstGeom>
-          <a:noFill/>
-        </p:spPr>
-        <p:txBody>
-          <a:bodyPr wrap="none" lIns="138596" tIns="69298" rIns="138596" bIns="69298" rtlCol="0">
-            <a:spAutoFit/>
-          </a:bodyPr>
-          <a:lstStyle/>
-          <a:p>
-            <a:r>
-              <a:rPr lang="en-US" sz="1000" dirty="0" err="1"/>
-              <a:t>tlsio_close_async</a:t>
             </a:r>
             <a:endParaRPr lang="en-US" sz="1000" dirty="0"/>
           </a:p>
@@ -4231,7 +4047,7 @@
         </p:nvSpPr>
         <p:spPr>
           <a:xfrm>
-            <a:off x="1416370" y="4598351"/>
+            <a:off x="1416370" y="4445951"/>
             <a:ext cx="2165030" cy="278449"/>
           </a:xfrm>
           <a:prstGeom prst="rect">
@@ -4331,691 +4147,6 @@
       </p:cxnSp>
       <p:cxnSp>
         <p:nvCxnSpPr>
-          <p:cNvPr id="144" name="Straight Arrow Connector 143"/>
-          <p:cNvCxnSpPr/>
-          <p:nvPr/>
-        </p:nvCxnSpPr>
-        <p:spPr>
-          <a:xfrm>
-            <a:off x="6370197" y="2667000"/>
-            <a:ext cx="182880" cy="0"/>
-          </a:xfrm>
-          <a:prstGeom prst="straightConnector1">
-            <a:avLst/>
-          </a:prstGeom>
-          <a:ln w="19050">
-            <a:tailEnd type="none"/>
-          </a:ln>
-        </p:spPr>
-        <p:style>
-          <a:lnRef idx="1">
-            <a:schemeClr val="accent1"/>
-          </a:lnRef>
-          <a:fillRef idx="0">
-            <a:schemeClr val="accent1"/>
-          </a:fillRef>
-          <a:effectRef idx="0">
-            <a:schemeClr val="accent1"/>
-          </a:effectRef>
-          <a:fontRef idx="minor">
-            <a:schemeClr val="tx1"/>
-          </a:fontRef>
-        </p:style>
-      </p:cxnSp>
-      <p:cxnSp>
-        <p:nvCxnSpPr>
-          <p:cNvPr id="145" name="Straight Arrow Connector 144"/>
-          <p:cNvCxnSpPr/>
-          <p:nvPr/>
-        </p:nvCxnSpPr>
-        <p:spPr>
-          <a:xfrm flipH="1" flipV="1">
-            <a:off x="6370197" y="2889631"/>
-            <a:ext cx="182880" cy="0"/>
-          </a:xfrm>
-          <a:prstGeom prst="straightConnector1">
-            <a:avLst/>
-          </a:prstGeom>
-          <a:ln w="19050">
-            <a:tailEnd type="triangle"/>
-          </a:ln>
-        </p:spPr>
-        <p:style>
-          <a:lnRef idx="1">
-            <a:schemeClr val="accent1"/>
-          </a:lnRef>
-          <a:fillRef idx="0">
-            <a:schemeClr val="accent1"/>
-          </a:fillRef>
-          <a:effectRef idx="0">
-            <a:schemeClr val="accent1"/>
-          </a:effectRef>
-          <a:fontRef idx="minor">
-            <a:schemeClr val="tx1"/>
-          </a:fontRef>
-        </p:style>
-      </p:cxnSp>
-      <p:cxnSp>
-        <p:nvCxnSpPr>
-          <p:cNvPr id="146" name="Straight Arrow Connector 145"/>
-          <p:cNvCxnSpPr/>
-          <p:nvPr/>
-        </p:nvCxnSpPr>
-        <p:spPr>
-          <a:xfrm flipH="1">
-            <a:off x="6553077" y="2667000"/>
-            <a:ext cx="1" cy="222631"/>
-          </a:xfrm>
-          <a:prstGeom prst="straightConnector1">
-            <a:avLst/>
-          </a:prstGeom>
-          <a:ln w="19050">
-            <a:tailEnd type="none"/>
-          </a:ln>
-        </p:spPr>
-        <p:style>
-          <a:lnRef idx="1">
-            <a:schemeClr val="accent1"/>
-          </a:lnRef>
-          <a:fillRef idx="0">
-            <a:schemeClr val="accent1"/>
-          </a:fillRef>
-          <a:effectRef idx="0">
-            <a:schemeClr val="accent1"/>
-          </a:effectRef>
-          <a:fontRef idx="minor">
-            <a:schemeClr val="tx1"/>
-          </a:fontRef>
-        </p:style>
-      </p:cxnSp>
-      <p:sp>
-        <p:nvSpPr>
-          <p:cNvPr id="147" name="TextBox 146"/>
-          <p:cNvSpPr txBox="1"/>
-          <p:nvPr/>
-        </p:nvSpPr>
-        <p:spPr>
-          <a:xfrm>
-            <a:off x="6281030" y="2405580"/>
-            <a:ext cx="957970" cy="293838"/>
-          </a:xfrm>
-          <a:prstGeom prst="rect">
-            <a:avLst/>
-          </a:prstGeom>
-          <a:noFill/>
-        </p:spPr>
-        <p:txBody>
-          <a:bodyPr wrap="none" lIns="138596" tIns="69298" rIns="138596" bIns="69298" rtlCol="0">
-            <a:spAutoFit/>
-          </a:bodyPr>
-          <a:lstStyle/>
-          <a:p>
-            <a:r>
-              <a:rPr lang="en-US" sz="1000" dirty="0" err="1"/>
-              <a:t>tlsio_dowork</a:t>
-            </a:r>
-            <a:endParaRPr lang="en-US" sz="1000" dirty="0"/>
-          </a:p>
-        </p:txBody>
-      </p:sp>
-      <p:cxnSp>
-        <p:nvCxnSpPr>
-          <p:cNvPr id="148" name="Straight Arrow Connector 147"/>
-          <p:cNvCxnSpPr/>
-          <p:nvPr/>
-        </p:nvCxnSpPr>
-        <p:spPr>
-          <a:xfrm flipH="1" flipV="1">
-            <a:off x="3854230" y="3017520"/>
-            <a:ext cx="2041" cy="182880"/>
-          </a:xfrm>
-          <a:prstGeom prst="straightConnector1">
-            <a:avLst/>
-          </a:prstGeom>
-          <a:ln w="19050">
-            <a:tailEnd type="none"/>
-          </a:ln>
-        </p:spPr>
-        <p:style>
-          <a:lnRef idx="1">
-            <a:schemeClr val="accent1"/>
-          </a:lnRef>
-          <a:fillRef idx="0">
-            <a:schemeClr val="accent1"/>
-          </a:fillRef>
-          <a:effectRef idx="0">
-            <a:schemeClr val="accent1"/>
-          </a:effectRef>
-          <a:fontRef idx="minor">
-            <a:schemeClr val="tx1"/>
-          </a:fontRef>
-        </p:style>
-      </p:cxnSp>
-      <p:cxnSp>
-        <p:nvCxnSpPr>
-          <p:cNvPr id="149" name="Straight Arrow Connector 148"/>
-          <p:cNvCxnSpPr/>
-          <p:nvPr/>
-        </p:nvCxnSpPr>
-        <p:spPr>
-          <a:xfrm flipH="1" flipV="1">
-            <a:off x="4203425" y="3017520"/>
-            <a:ext cx="1" cy="182880"/>
-          </a:xfrm>
-          <a:prstGeom prst="straightConnector1">
-            <a:avLst/>
-          </a:prstGeom>
-          <a:ln w="19050">
-            <a:tailEnd type="triangle"/>
-          </a:ln>
-        </p:spPr>
-        <p:style>
-          <a:lnRef idx="1">
-            <a:schemeClr val="accent1"/>
-          </a:lnRef>
-          <a:fillRef idx="0">
-            <a:schemeClr val="accent1"/>
-          </a:fillRef>
-          <a:effectRef idx="0">
-            <a:schemeClr val="accent1"/>
-          </a:effectRef>
-          <a:fontRef idx="minor">
-            <a:schemeClr val="tx1"/>
-          </a:fontRef>
-        </p:style>
-      </p:cxnSp>
-      <p:cxnSp>
-        <p:nvCxnSpPr>
-          <p:cNvPr id="150" name="Straight Arrow Connector 149"/>
-          <p:cNvCxnSpPr/>
-          <p:nvPr/>
-        </p:nvCxnSpPr>
-        <p:spPr>
-          <a:xfrm flipH="1">
-            <a:off x="3854230" y="3191117"/>
-            <a:ext cx="349195" cy="0"/>
-          </a:xfrm>
-          <a:prstGeom prst="straightConnector1">
-            <a:avLst/>
-          </a:prstGeom>
-          <a:ln w="19050">
-            <a:tailEnd type="none"/>
-          </a:ln>
-        </p:spPr>
-        <p:style>
-          <a:lnRef idx="1">
-            <a:schemeClr val="accent1"/>
-          </a:lnRef>
-          <a:fillRef idx="0">
-            <a:schemeClr val="accent1"/>
-          </a:fillRef>
-          <a:effectRef idx="0">
-            <a:schemeClr val="accent1"/>
-          </a:effectRef>
-          <a:fontRef idx="minor">
-            <a:schemeClr val="tx1"/>
-          </a:fontRef>
-        </p:style>
-      </p:cxnSp>
-      <p:cxnSp>
-        <p:nvCxnSpPr>
-          <p:cNvPr id="152" name="Straight Arrow Connector 151"/>
-          <p:cNvCxnSpPr/>
-          <p:nvPr/>
-        </p:nvCxnSpPr>
-        <p:spPr>
-          <a:xfrm flipH="1" flipV="1">
-            <a:off x="3773679" y="975059"/>
-            <a:ext cx="2041" cy="198467"/>
-          </a:xfrm>
-          <a:prstGeom prst="straightConnector1">
-            <a:avLst/>
-          </a:prstGeom>
-          <a:ln w="19050">
-            <a:tailEnd type="none"/>
-          </a:ln>
-        </p:spPr>
-        <p:style>
-          <a:lnRef idx="1">
-            <a:schemeClr val="accent1"/>
-          </a:lnRef>
-          <a:fillRef idx="0">
-            <a:schemeClr val="accent1"/>
-          </a:fillRef>
-          <a:effectRef idx="0">
-            <a:schemeClr val="accent1"/>
-          </a:effectRef>
-          <a:fontRef idx="minor">
-            <a:schemeClr val="tx1"/>
-          </a:fontRef>
-        </p:style>
-      </p:cxnSp>
-      <p:cxnSp>
-        <p:nvCxnSpPr>
-          <p:cNvPr id="153" name="Straight Arrow Connector 152"/>
-          <p:cNvCxnSpPr/>
-          <p:nvPr/>
-        </p:nvCxnSpPr>
-        <p:spPr>
-          <a:xfrm>
-            <a:off x="4137397" y="975059"/>
-            <a:ext cx="0" cy="198467"/>
-          </a:xfrm>
-          <a:prstGeom prst="straightConnector1">
-            <a:avLst/>
-          </a:prstGeom>
-          <a:ln w="19050">
-            <a:tailEnd type="triangle"/>
-          </a:ln>
-        </p:spPr>
-        <p:style>
-          <a:lnRef idx="1">
-            <a:schemeClr val="accent1"/>
-          </a:lnRef>
-          <a:fillRef idx="0">
-            <a:schemeClr val="accent1"/>
-          </a:fillRef>
-          <a:effectRef idx="0">
-            <a:schemeClr val="accent1"/>
-          </a:effectRef>
-          <a:fontRef idx="minor">
-            <a:schemeClr val="tx1"/>
-          </a:fontRef>
-        </p:style>
-      </p:cxnSp>
-      <p:cxnSp>
-        <p:nvCxnSpPr>
-          <p:cNvPr id="154" name="Straight Arrow Connector 153"/>
-          <p:cNvCxnSpPr/>
-          <p:nvPr/>
-        </p:nvCxnSpPr>
-        <p:spPr>
-          <a:xfrm flipH="1">
-            <a:off x="3773679" y="975059"/>
-            <a:ext cx="363718" cy="0"/>
-          </a:xfrm>
-          <a:prstGeom prst="straightConnector1">
-            <a:avLst/>
-          </a:prstGeom>
-          <a:ln w="19050">
-            <a:tailEnd type="none"/>
-          </a:ln>
-        </p:spPr>
-        <p:style>
-          <a:lnRef idx="1">
-            <a:schemeClr val="accent1"/>
-          </a:lnRef>
-          <a:fillRef idx="0">
-            <a:schemeClr val="accent1"/>
-          </a:fillRef>
-          <a:effectRef idx="0">
-            <a:schemeClr val="accent1"/>
-          </a:effectRef>
-          <a:fontRef idx="minor">
-            <a:schemeClr val="tx1"/>
-          </a:fontRef>
-        </p:style>
-      </p:cxnSp>
-      <p:sp>
-        <p:nvSpPr>
-          <p:cNvPr id="155" name="TextBox 154"/>
-          <p:cNvSpPr txBox="1"/>
-          <p:nvPr/>
-        </p:nvSpPr>
-        <p:spPr>
-          <a:xfrm>
-            <a:off x="3450316" y="685800"/>
-            <a:ext cx="957970" cy="293838"/>
-          </a:xfrm>
-          <a:prstGeom prst="rect">
-            <a:avLst/>
-          </a:prstGeom>
-          <a:noFill/>
-        </p:spPr>
-        <p:txBody>
-          <a:bodyPr wrap="none" lIns="138596" tIns="69298" rIns="138596" bIns="69298" rtlCol="0">
-            <a:spAutoFit/>
-          </a:bodyPr>
-          <a:lstStyle/>
-          <a:p>
-            <a:r>
-              <a:rPr lang="en-US" sz="1000" dirty="0" err="1"/>
-              <a:t>tlsio_dowork</a:t>
-            </a:r>
-            <a:endParaRPr lang="en-US" sz="1000" dirty="0"/>
-          </a:p>
-        </p:txBody>
-      </p:sp>
-      <p:cxnSp>
-        <p:nvCxnSpPr>
-          <p:cNvPr id="156" name="Straight Arrow Connector 155"/>
-          <p:cNvCxnSpPr/>
-          <p:nvPr/>
-        </p:nvCxnSpPr>
-        <p:spPr>
-          <a:xfrm flipH="1" flipV="1">
-            <a:off x="3721041" y="4590494"/>
-            <a:ext cx="2041" cy="182880"/>
-          </a:xfrm>
-          <a:prstGeom prst="straightConnector1">
-            <a:avLst/>
-          </a:prstGeom>
-          <a:ln w="19050">
-            <a:tailEnd type="none"/>
-          </a:ln>
-        </p:spPr>
-        <p:style>
-          <a:lnRef idx="1">
-            <a:schemeClr val="accent1"/>
-          </a:lnRef>
-          <a:fillRef idx="0">
-            <a:schemeClr val="accent1"/>
-          </a:fillRef>
-          <a:effectRef idx="0">
-            <a:schemeClr val="accent1"/>
-          </a:effectRef>
-          <a:fontRef idx="minor">
-            <a:schemeClr val="tx1"/>
-          </a:fontRef>
-        </p:style>
-      </p:cxnSp>
-      <p:cxnSp>
-        <p:nvCxnSpPr>
-          <p:cNvPr id="157" name="Straight Arrow Connector 156"/>
-          <p:cNvCxnSpPr/>
-          <p:nvPr/>
-        </p:nvCxnSpPr>
-        <p:spPr>
-          <a:xfrm flipV="1">
-            <a:off x="4086801" y="4590494"/>
-            <a:ext cx="0" cy="182880"/>
-          </a:xfrm>
-          <a:prstGeom prst="straightConnector1">
-            <a:avLst/>
-          </a:prstGeom>
-          <a:ln w="19050">
-            <a:tailEnd type="triangle"/>
-          </a:ln>
-        </p:spPr>
-        <p:style>
-          <a:lnRef idx="1">
-            <a:schemeClr val="accent1"/>
-          </a:lnRef>
-          <a:fillRef idx="0">
-            <a:schemeClr val="accent1"/>
-          </a:fillRef>
-          <a:effectRef idx="0">
-            <a:schemeClr val="accent1"/>
-          </a:effectRef>
-          <a:fontRef idx="minor">
-            <a:schemeClr val="tx1"/>
-          </a:fontRef>
-        </p:style>
-      </p:cxnSp>
-      <p:cxnSp>
-        <p:nvCxnSpPr>
-          <p:cNvPr id="158" name="Straight Arrow Connector 157"/>
-          <p:cNvCxnSpPr/>
-          <p:nvPr/>
-        </p:nvCxnSpPr>
-        <p:spPr>
-          <a:xfrm flipH="1">
-            <a:off x="3723083" y="4773374"/>
-            <a:ext cx="363718" cy="0"/>
-          </a:xfrm>
-          <a:prstGeom prst="straightConnector1">
-            <a:avLst/>
-          </a:prstGeom>
-          <a:ln w="19050">
-            <a:tailEnd type="none"/>
-          </a:ln>
-        </p:spPr>
-        <p:style>
-          <a:lnRef idx="1">
-            <a:schemeClr val="accent1"/>
-          </a:lnRef>
-          <a:fillRef idx="0">
-            <a:schemeClr val="accent1"/>
-          </a:fillRef>
-          <a:effectRef idx="0">
-            <a:schemeClr val="accent1"/>
-          </a:effectRef>
-          <a:fontRef idx="minor">
-            <a:schemeClr val="tx1"/>
-          </a:fontRef>
-        </p:style>
-      </p:cxnSp>
-      <p:sp>
-        <p:nvSpPr>
-          <p:cNvPr id="159" name="TextBox 158"/>
-          <p:cNvSpPr txBox="1"/>
-          <p:nvPr/>
-        </p:nvSpPr>
-        <p:spPr>
-          <a:xfrm>
-            <a:off x="3433631" y="4735362"/>
-            <a:ext cx="957970" cy="293838"/>
-          </a:xfrm>
-          <a:prstGeom prst="rect">
-            <a:avLst/>
-          </a:prstGeom>
-          <a:noFill/>
-        </p:spPr>
-        <p:txBody>
-          <a:bodyPr wrap="none" lIns="138596" tIns="69298" rIns="138596" bIns="69298" rtlCol="0">
-            <a:spAutoFit/>
-          </a:bodyPr>
-          <a:lstStyle/>
-          <a:p>
-            <a:r>
-              <a:rPr lang="en-US" sz="1000" dirty="0" err="1"/>
-              <a:t>tlsio_dowork</a:t>
-            </a:r>
-            <a:endParaRPr lang="en-US" sz="1000" dirty="0"/>
-          </a:p>
-        </p:txBody>
-      </p:sp>
-      <p:cxnSp>
-        <p:nvCxnSpPr>
-          <p:cNvPr id="160" name="Straight Arrow Connector 159"/>
-          <p:cNvCxnSpPr/>
-          <p:nvPr/>
-        </p:nvCxnSpPr>
-        <p:spPr>
-          <a:xfrm flipH="1" flipV="1">
-            <a:off x="1383505" y="2907042"/>
-            <a:ext cx="182880" cy="0"/>
-          </a:xfrm>
-          <a:prstGeom prst="straightConnector1">
-            <a:avLst/>
-          </a:prstGeom>
-          <a:ln w="19050">
-            <a:tailEnd type="none"/>
-          </a:ln>
-        </p:spPr>
-        <p:style>
-          <a:lnRef idx="1">
-            <a:schemeClr val="accent1"/>
-          </a:lnRef>
-          <a:fillRef idx="0">
-            <a:schemeClr val="accent1"/>
-          </a:fillRef>
-          <a:effectRef idx="0">
-            <a:schemeClr val="accent1"/>
-          </a:effectRef>
-          <a:fontRef idx="minor">
-            <a:schemeClr val="tx1"/>
-          </a:fontRef>
-        </p:style>
-      </p:cxnSp>
-      <p:cxnSp>
-        <p:nvCxnSpPr>
-          <p:cNvPr id="161" name="Straight Arrow Connector 160"/>
-          <p:cNvCxnSpPr/>
-          <p:nvPr/>
-        </p:nvCxnSpPr>
-        <p:spPr>
-          <a:xfrm flipV="1">
-            <a:off x="1387966" y="2706044"/>
-            <a:ext cx="182880" cy="0"/>
-          </a:xfrm>
-          <a:prstGeom prst="straightConnector1">
-            <a:avLst/>
-          </a:prstGeom>
-          <a:ln w="19050">
-            <a:tailEnd type="triangle"/>
-          </a:ln>
-        </p:spPr>
-        <p:style>
-          <a:lnRef idx="1">
-            <a:schemeClr val="accent1"/>
-          </a:lnRef>
-          <a:fillRef idx="0">
-            <a:schemeClr val="accent1"/>
-          </a:fillRef>
-          <a:effectRef idx="0">
-            <a:schemeClr val="accent1"/>
-          </a:effectRef>
-          <a:fontRef idx="minor">
-            <a:schemeClr val="tx1"/>
-          </a:fontRef>
-        </p:style>
-      </p:cxnSp>
-      <p:cxnSp>
-        <p:nvCxnSpPr>
-          <p:cNvPr id="162" name="Straight Arrow Connector 161"/>
-          <p:cNvCxnSpPr/>
-          <p:nvPr/>
-        </p:nvCxnSpPr>
-        <p:spPr>
-          <a:xfrm>
-            <a:off x="1383505" y="2706044"/>
-            <a:ext cx="0" cy="200998"/>
-          </a:xfrm>
-          <a:prstGeom prst="straightConnector1">
-            <a:avLst/>
-          </a:prstGeom>
-          <a:ln w="19050">
-            <a:tailEnd type="none"/>
-          </a:ln>
-        </p:spPr>
-        <p:style>
-          <a:lnRef idx="1">
-            <a:schemeClr val="accent1"/>
-          </a:lnRef>
-          <a:fillRef idx="0">
-            <a:schemeClr val="accent1"/>
-          </a:fillRef>
-          <a:effectRef idx="0">
-            <a:schemeClr val="accent1"/>
-          </a:effectRef>
-          <a:fontRef idx="minor">
-            <a:schemeClr val="tx1"/>
-          </a:fontRef>
-        </p:style>
-      </p:cxnSp>
-      <p:sp>
-        <p:nvSpPr>
-          <p:cNvPr id="163" name="TextBox 162"/>
-          <p:cNvSpPr txBox="1"/>
-          <p:nvPr/>
-        </p:nvSpPr>
-        <p:spPr>
-          <a:xfrm>
-            <a:off x="2262569" y="1306362"/>
-            <a:ext cx="957970" cy="293838"/>
-          </a:xfrm>
-          <a:prstGeom prst="rect">
-            <a:avLst/>
-          </a:prstGeom>
-          <a:noFill/>
-        </p:spPr>
-        <p:txBody>
-          <a:bodyPr wrap="none" lIns="138596" tIns="69298" rIns="138596" bIns="69298" rtlCol="0">
-            <a:spAutoFit/>
-          </a:bodyPr>
-          <a:lstStyle/>
-          <a:p>
-            <a:r>
-              <a:rPr lang="en-US" sz="1000" dirty="0" err="1"/>
-              <a:t>tlsio_dowork</a:t>
-            </a:r>
-            <a:endParaRPr lang="en-US" sz="1000" dirty="0"/>
-          </a:p>
-        </p:txBody>
-      </p:sp>
-      <p:cxnSp>
-        <p:nvCxnSpPr>
-          <p:cNvPr id="168" name="Straight Arrow Connector 167"/>
-          <p:cNvCxnSpPr>
-            <a:stCxn id="121" idx="2"/>
-          </p:cNvCxnSpPr>
-          <p:nvPr/>
-        </p:nvCxnSpPr>
-        <p:spPr>
-          <a:xfrm flipH="1">
-            <a:off x="5925964" y="3017474"/>
-            <a:ext cx="1" cy="1351428"/>
-          </a:xfrm>
-          <a:prstGeom prst="straightConnector1">
-            <a:avLst/>
-          </a:prstGeom>
-          <a:ln w="19050">
-            <a:tailEnd type="none"/>
-          </a:ln>
-        </p:spPr>
-        <p:style>
-          <a:lnRef idx="1">
-            <a:schemeClr val="accent1"/>
-          </a:lnRef>
-          <a:fillRef idx="0">
-            <a:schemeClr val="accent1"/>
-          </a:fillRef>
-          <a:effectRef idx="0">
-            <a:schemeClr val="accent1"/>
-          </a:effectRef>
-          <a:fontRef idx="minor">
-            <a:schemeClr val="tx1"/>
-          </a:fontRef>
-        </p:style>
-      </p:cxnSp>
-      <p:cxnSp>
-        <p:nvCxnSpPr>
-          <p:cNvPr id="170" name="Straight Arrow Connector 169"/>
-          <p:cNvCxnSpPr>
-            <a:endCxn id="123" idx="3"/>
-          </p:cNvCxnSpPr>
-          <p:nvPr/>
-        </p:nvCxnSpPr>
-        <p:spPr>
-          <a:xfrm flipH="1">
-            <a:off x="4330640" y="4368902"/>
-            <a:ext cx="1595324" cy="0"/>
-          </a:xfrm>
-          <a:prstGeom prst="straightConnector1">
-            <a:avLst/>
-          </a:prstGeom>
-          <a:ln w="19050">
-            <a:tailEnd type="triangle"/>
-          </a:ln>
-        </p:spPr>
-        <p:style>
-          <a:lnRef idx="1">
-            <a:schemeClr val="accent1"/>
-          </a:lnRef>
-          <a:fillRef idx="0">
-            <a:schemeClr val="accent1"/>
-          </a:fillRef>
-          <a:effectRef idx="0">
-            <a:schemeClr val="accent1"/>
-          </a:effectRef>
-          <a:fontRef idx="minor">
-            <a:schemeClr val="tx1"/>
-          </a:fontRef>
-        </p:style>
-      </p:cxnSp>
-      <p:cxnSp>
-        <p:nvCxnSpPr>
           <p:cNvPr id="172" name="Straight Arrow Connector 171"/>
           <p:cNvCxnSpPr/>
           <p:nvPr/>
@@ -5058,7 +4189,7 @@
         </p:nvSpPr>
         <p:spPr>
           <a:xfrm>
-            <a:off x="585241" y="225623"/>
+            <a:off x="152400" y="76200"/>
             <a:ext cx="1700759" cy="307777"/>
           </a:xfrm>
           <a:prstGeom prst="rect">
@@ -5074,47 +4205,12 @@
           <a:p>
             <a:pPr algn="ctr"/>
             <a:r>
-              <a:rPr lang="en-US" dirty="0"/>
+              <a:rPr lang="en-US" b="1" dirty="0"/>
               <a:t>TLSIO State Diagram</a:t>
             </a:r>
           </a:p>
         </p:txBody>
       </p:sp>
-      <p:cxnSp>
-        <p:nvCxnSpPr>
-          <p:cNvPr id="186" name="Straight Arrow Connector 185"/>
-          <p:cNvCxnSpPr>
-            <a:endCxn id="122" idx="0"/>
-          </p:cNvCxnSpPr>
-          <p:nvPr/>
-        </p:nvCxnSpPr>
-        <p:spPr>
-          <a:xfrm>
-            <a:off x="1949292" y="1533030"/>
-            <a:ext cx="1" cy="1057770"/>
-          </a:xfrm>
-          <a:prstGeom prst="straightConnector1">
-            <a:avLst/>
-          </a:prstGeom>
-          <a:ln w="19050">
-            <a:tailEnd type="none"/>
-          </a:ln>
-        </p:spPr>
-        <p:style>
-          <a:lnRef idx="1">
-            <a:schemeClr val="accent1"/>
-          </a:lnRef>
-          <a:fillRef idx="0">
-            <a:schemeClr val="accent1"/>
-          </a:fillRef>
-          <a:effectRef idx="0">
-            <a:schemeClr val="accent1"/>
-          </a:effectRef>
-          <a:fontRef idx="minor">
-            <a:schemeClr val="tx1"/>
-          </a:fontRef>
-        </p:style>
-      </p:cxnSp>
       <p:cxnSp>
         <p:nvCxnSpPr>
           <p:cNvPr id="194" name="Straight Arrow Connector 193"/>
@@ -5217,66 +4313,6 @@
           </a:fontRef>
         </p:style>
       </p:cxnSp>
-      <p:sp>
-        <p:nvSpPr>
-          <p:cNvPr id="207" name="TextBox 206"/>
-          <p:cNvSpPr txBox="1"/>
-          <p:nvPr/>
-        </p:nvSpPr>
-        <p:spPr>
-          <a:xfrm>
-            <a:off x="2209800" y="4443766"/>
-            <a:ext cx="1180787" cy="293838"/>
-          </a:xfrm>
-          <a:prstGeom prst="rect">
-            <a:avLst/>
-          </a:prstGeom>
-          <a:noFill/>
-        </p:spPr>
-        <p:txBody>
-          <a:bodyPr wrap="none" lIns="138596" tIns="69298" rIns="138596" bIns="69298" rtlCol="0">
-            <a:spAutoFit/>
-          </a:bodyPr>
-          <a:lstStyle/>
-          <a:p>
-            <a:r>
-              <a:rPr lang="en-US" sz="1000" dirty="0" err="1"/>
-              <a:t>tlsio_close_async</a:t>
-            </a:r>
-            <a:endParaRPr lang="en-US" sz="1000" dirty="0"/>
-          </a:p>
-        </p:txBody>
-      </p:sp>
-      <p:sp>
-        <p:nvSpPr>
-          <p:cNvPr id="57" name="TextBox 56"/>
-          <p:cNvSpPr txBox="1"/>
-          <p:nvPr/>
-        </p:nvSpPr>
-        <p:spPr>
-          <a:xfrm>
-            <a:off x="685800" y="2438400"/>
-            <a:ext cx="957970" cy="293838"/>
-          </a:xfrm>
-          <a:prstGeom prst="rect">
-            <a:avLst/>
-          </a:prstGeom>
-          <a:noFill/>
-        </p:spPr>
-        <p:txBody>
-          <a:bodyPr wrap="none" lIns="138596" tIns="69298" rIns="138596" bIns="69298" rtlCol="0">
-            <a:spAutoFit/>
-          </a:bodyPr>
-          <a:lstStyle/>
-          <a:p>
-            <a:r>
-              <a:rPr lang="en-US" sz="1000" dirty="0" err="1"/>
-              <a:t>tlsio_dowork</a:t>
-            </a:r>
-            <a:endParaRPr lang="en-US" sz="1000" dirty="0"/>
-          </a:p>
-        </p:txBody>
-      </p:sp>
       <p:cxnSp>
         <p:nvCxnSpPr>
           <p:cNvPr id="60" name="Straight Arrow Connector 59"/>
@@ -5353,7 +4389,7 @@
         </p:nvCxnSpPr>
         <p:spPr>
           <a:xfrm flipV="1">
-            <a:off x="6468117" y="381125"/>
+            <a:off x="6574797" y="172340"/>
             <a:ext cx="457200" cy="0"/>
           </a:xfrm>
           <a:prstGeom prst="straightConnector1">
@@ -5387,7 +4423,7 @@
         </p:nvSpPr>
         <p:spPr>
           <a:xfrm>
-            <a:off x="4800600" y="208785"/>
+            <a:off x="4907280" y="0"/>
             <a:ext cx="1670472" cy="324615"/>
           </a:xfrm>
           <a:prstGeom prst="rect">
@@ -5401,6 +4437,7 @@
           </a:bodyPr>
           <a:lstStyle/>
           <a:p>
+            <a:pPr algn="r"/>
             <a:r>
               <a:rPr lang="en-US" sz="1200" dirty="0" err="1" smtClean="0"/>
               <a:t>tlsio_close_async</a:t>
@@ -5416,6 +4453,444 @@
           </a:p>
         </p:txBody>
       </p:sp>
+      <p:cxnSp>
+        <p:nvCxnSpPr>
+          <p:cNvPr id="12" name="Curved Connector 11"/>
+          <p:cNvCxnSpPr>
+            <a:stCxn id="121" idx="2"/>
+            <a:endCxn id="123" idx="3"/>
+          </p:cNvCxnSpPr>
+          <p:nvPr/>
+        </p:nvCxnSpPr>
+        <p:spPr>
+          <a:xfrm rot="5400000">
+            <a:off x="4443084" y="2905031"/>
+            <a:ext cx="1370439" cy="1595325"/>
+          </a:xfrm>
+          <a:prstGeom prst="curvedConnector2">
+            <a:avLst/>
+          </a:prstGeom>
+          <a:ln w="19050">
+            <a:tailEnd type="triangle"/>
+          </a:ln>
+        </p:spPr>
+        <p:style>
+          <a:lnRef idx="1">
+            <a:schemeClr val="accent1"/>
+          </a:lnRef>
+          <a:fillRef idx="0">
+            <a:schemeClr val="accent1"/>
+          </a:fillRef>
+          <a:effectRef idx="0">
+            <a:schemeClr val="accent1"/>
+          </a:effectRef>
+          <a:fontRef idx="minor">
+            <a:schemeClr val="tx1"/>
+          </a:fontRef>
+        </p:style>
+      </p:cxnSp>
+      <p:sp>
+        <p:nvSpPr>
+          <p:cNvPr id="33" name="Curved Left Arrow 32"/>
+          <p:cNvSpPr/>
+          <p:nvPr/>
+        </p:nvSpPr>
+        <p:spPr>
+          <a:xfrm>
+            <a:off x="6583680" y="304800"/>
+            <a:ext cx="198357" cy="248414"/>
+          </a:xfrm>
+          <a:prstGeom prst="curvedLeftArrow">
+            <a:avLst>
+              <a:gd name="adj1" fmla="val 0"/>
+              <a:gd name="adj2" fmla="val 28579"/>
+              <a:gd name="adj3" fmla="val 20742"/>
+            </a:avLst>
+          </a:prstGeom>
+          <a:ln w="19050"/>
+        </p:spPr>
+        <p:style>
+          <a:lnRef idx="2">
+            <a:schemeClr val="accent1">
+              <a:shade val="50000"/>
+            </a:schemeClr>
+          </a:lnRef>
+          <a:fillRef idx="1">
+            <a:schemeClr val="accent1"/>
+          </a:fillRef>
+          <a:effectRef idx="0">
+            <a:schemeClr val="accent1"/>
+          </a:effectRef>
+          <a:fontRef idx="minor">
+            <a:schemeClr val="lt1"/>
+          </a:fontRef>
+        </p:style>
+        <p:txBody>
+          <a:bodyPr rtlCol="0" anchor="ctr"/>
+          <a:lstStyle/>
+          <a:p>
+            <a:pPr algn="ctr"/>
+            <a:endParaRPr lang="en-US">
+              <a:solidFill>
+                <a:schemeClr val="tx1"/>
+              </a:solidFill>
+            </a:endParaRPr>
+          </a:p>
+        </p:txBody>
+      </p:sp>
+      <p:sp>
+        <p:nvSpPr>
+          <p:cNvPr id="95" name="Curved Left Arrow 94"/>
+          <p:cNvSpPr/>
+          <p:nvPr/>
+        </p:nvSpPr>
+        <p:spPr>
+          <a:xfrm>
+            <a:off x="6387783" y="2694723"/>
+            <a:ext cx="198357" cy="248414"/>
+          </a:xfrm>
+          <a:prstGeom prst="curvedLeftArrow">
+            <a:avLst>
+              <a:gd name="adj1" fmla="val 0"/>
+              <a:gd name="adj2" fmla="val 28579"/>
+              <a:gd name="adj3" fmla="val 20742"/>
+            </a:avLst>
+          </a:prstGeom>
+          <a:ln w="19050"/>
+        </p:spPr>
+        <p:style>
+          <a:lnRef idx="2">
+            <a:schemeClr val="accent1">
+              <a:shade val="50000"/>
+            </a:schemeClr>
+          </a:lnRef>
+          <a:fillRef idx="1">
+            <a:schemeClr val="accent1"/>
+          </a:fillRef>
+          <a:effectRef idx="0">
+            <a:schemeClr val="accent1"/>
+          </a:effectRef>
+          <a:fontRef idx="minor">
+            <a:schemeClr val="lt1"/>
+          </a:fontRef>
+        </p:style>
+        <p:txBody>
+          <a:bodyPr rtlCol="0" anchor="ctr"/>
+          <a:lstStyle/>
+          <a:p>
+            <a:pPr algn="ctr"/>
+            <a:endParaRPr lang="en-US">
+              <a:solidFill>
+                <a:schemeClr val="tx1"/>
+              </a:solidFill>
+            </a:endParaRPr>
+          </a:p>
+        </p:txBody>
+      </p:sp>
+      <p:sp>
+        <p:nvSpPr>
+          <p:cNvPr id="96" name="Curved Left Arrow 95"/>
+          <p:cNvSpPr/>
+          <p:nvPr/>
+        </p:nvSpPr>
+        <p:spPr>
+          <a:xfrm rot="5400000">
+            <a:off x="3863221" y="4490206"/>
+            <a:ext cx="198357" cy="457200"/>
+          </a:xfrm>
+          <a:prstGeom prst="curvedLeftArrow">
+            <a:avLst>
+              <a:gd name="adj1" fmla="val 0"/>
+              <a:gd name="adj2" fmla="val 28579"/>
+              <a:gd name="adj3" fmla="val 20742"/>
+            </a:avLst>
+          </a:prstGeom>
+          <a:ln w="19050"/>
+        </p:spPr>
+        <p:style>
+          <a:lnRef idx="2">
+            <a:schemeClr val="accent1">
+              <a:shade val="50000"/>
+            </a:schemeClr>
+          </a:lnRef>
+          <a:fillRef idx="1">
+            <a:schemeClr val="accent1"/>
+          </a:fillRef>
+          <a:effectRef idx="0">
+            <a:schemeClr val="accent1"/>
+          </a:effectRef>
+          <a:fontRef idx="minor">
+            <a:schemeClr val="lt1"/>
+          </a:fontRef>
+        </p:style>
+        <p:txBody>
+          <a:bodyPr rtlCol="0" anchor="ctr"/>
+          <a:lstStyle/>
+          <a:p>
+            <a:pPr algn="ctr"/>
+            <a:endParaRPr lang="en-US">
+              <a:solidFill>
+                <a:schemeClr val="tx1"/>
+              </a:solidFill>
+            </a:endParaRPr>
+          </a:p>
+        </p:txBody>
+      </p:sp>
+      <p:sp>
+        <p:nvSpPr>
+          <p:cNvPr id="97" name="Curved Left Arrow 96"/>
+          <p:cNvSpPr/>
+          <p:nvPr/>
+        </p:nvSpPr>
+        <p:spPr>
+          <a:xfrm rot="10800000">
+            <a:off x="1362456" y="2679930"/>
+            <a:ext cx="198357" cy="248414"/>
+          </a:xfrm>
+          <a:prstGeom prst="curvedLeftArrow">
+            <a:avLst>
+              <a:gd name="adj1" fmla="val 0"/>
+              <a:gd name="adj2" fmla="val 28579"/>
+              <a:gd name="adj3" fmla="val 20742"/>
+            </a:avLst>
+          </a:prstGeom>
+          <a:ln w="19050"/>
+        </p:spPr>
+        <p:style>
+          <a:lnRef idx="2">
+            <a:schemeClr val="accent1">
+              <a:shade val="50000"/>
+            </a:schemeClr>
+          </a:lnRef>
+          <a:fillRef idx="1">
+            <a:schemeClr val="accent1"/>
+          </a:fillRef>
+          <a:effectRef idx="0">
+            <a:schemeClr val="accent1"/>
+          </a:effectRef>
+          <a:fontRef idx="minor">
+            <a:schemeClr val="lt1"/>
+          </a:fontRef>
+        </p:style>
+        <p:txBody>
+          <a:bodyPr rtlCol="0" anchor="ctr"/>
+          <a:lstStyle/>
+          <a:p>
+            <a:pPr algn="ctr"/>
+            <a:endParaRPr lang="en-US">
+              <a:solidFill>
+                <a:schemeClr val="tx1"/>
+              </a:solidFill>
+            </a:endParaRPr>
+          </a:p>
+        </p:txBody>
+      </p:sp>
+      <p:sp>
+        <p:nvSpPr>
+          <p:cNvPr id="98" name="Curved Left Arrow 97"/>
+          <p:cNvSpPr/>
+          <p:nvPr/>
+        </p:nvSpPr>
+        <p:spPr>
+          <a:xfrm rot="5400000">
+            <a:off x="3939421" y="2907792"/>
+            <a:ext cx="198357" cy="457200"/>
+          </a:xfrm>
+          <a:prstGeom prst="curvedLeftArrow">
+            <a:avLst>
+              <a:gd name="adj1" fmla="val 0"/>
+              <a:gd name="adj2" fmla="val 28579"/>
+              <a:gd name="adj3" fmla="val 20742"/>
+            </a:avLst>
+          </a:prstGeom>
+          <a:ln w="19050"/>
+        </p:spPr>
+        <p:style>
+          <a:lnRef idx="2">
+            <a:schemeClr val="accent1">
+              <a:shade val="50000"/>
+            </a:schemeClr>
+          </a:lnRef>
+          <a:fillRef idx="1">
+            <a:schemeClr val="accent1"/>
+          </a:fillRef>
+          <a:effectRef idx="0">
+            <a:schemeClr val="accent1"/>
+          </a:effectRef>
+          <a:fontRef idx="minor">
+            <a:schemeClr val="lt1"/>
+          </a:fontRef>
+        </p:style>
+        <p:txBody>
+          <a:bodyPr rtlCol="0" anchor="ctr"/>
+          <a:lstStyle/>
+          <a:p>
+            <a:pPr algn="ctr"/>
+            <a:endParaRPr lang="en-US">
+              <a:solidFill>
+                <a:schemeClr val="tx1"/>
+              </a:solidFill>
+            </a:endParaRPr>
+          </a:p>
+        </p:txBody>
+      </p:sp>
+      <p:sp>
+        <p:nvSpPr>
+          <p:cNvPr id="99" name="Curved Left Arrow 98"/>
+          <p:cNvSpPr/>
+          <p:nvPr/>
+        </p:nvSpPr>
+        <p:spPr>
+          <a:xfrm rot="16200000">
+            <a:off x="3863222" y="828711"/>
+            <a:ext cx="198357" cy="457200"/>
+          </a:xfrm>
+          <a:prstGeom prst="curvedLeftArrow">
+            <a:avLst>
+              <a:gd name="adj1" fmla="val 0"/>
+              <a:gd name="adj2" fmla="val 28579"/>
+              <a:gd name="adj3" fmla="val 20742"/>
+            </a:avLst>
+          </a:prstGeom>
+          <a:ln w="19050"/>
+        </p:spPr>
+        <p:style>
+          <a:lnRef idx="2">
+            <a:schemeClr val="accent1">
+              <a:shade val="50000"/>
+            </a:schemeClr>
+          </a:lnRef>
+          <a:fillRef idx="1">
+            <a:schemeClr val="accent1"/>
+          </a:fillRef>
+          <a:effectRef idx="0">
+            <a:schemeClr val="accent1"/>
+          </a:effectRef>
+          <a:fontRef idx="minor">
+            <a:schemeClr val="lt1"/>
+          </a:fontRef>
+        </p:style>
+        <p:txBody>
+          <a:bodyPr rtlCol="0" anchor="ctr"/>
+          <a:lstStyle/>
+          <a:p>
+            <a:pPr algn="ctr"/>
+            <a:endParaRPr lang="en-US">
+              <a:solidFill>
+                <a:schemeClr val="tx1"/>
+              </a:solidFill>
+            </a:endParaRPr>
+          </a:p>
+        </p:txBody>
+      </p:sp>
+      <p:cxnSp>
+        <p:nvCxnSpPr>
+          <p:cNvPr id="100" name="Curved Connector 99"/>
+          <p:cNvCxnSpPr>
+            <a:stCxn id="122" idx="0"/>
+          </p:cNvCxnSpPr>
+          <p:nvPr/>
+        </p:nvCxnSpPr>
+        <p:spPr>
+          <a:xfrm rot="5400000" flipH="1" flipV="1">
+            <a:off x="2177405" y="1224598"/>
+            <a:ext cx="1138091" cy="1594315"/>
+          </a:xfrm>
+          <a:prstGeom prst="curvedConnector2">
+            <a:avLst/>
+          </a:prstGeom>
+          <a:ln w="19050">
+            <a:tailEnd type="triangle"/>
+          </a:ln>
+        </p:spPr>
+        <p:style>
+          <a:lnRef idx="1">
+            <a:schemeClr val="accent1"/>
+          </a:lnRef>
+          <a:fillRef idx="0">
+            <a:schemeClr val="accent1"/>
+          </a:fillRef>
+          <a:effectRef idx="0">
+            <a:schemeClr val="accent1"/>
+          </a:effectRef>
+          <a:fontRef idx="minor">
+            <a:schemeClr val="tx1"/>
+          </a:fontRef>
+        </p:style>
+      </p:cxnSp>
+      <p:sp>
+        <p:nvSpPr>
+          <p:cNvPr id="103" name="TextBox 102"/>
+          <p:cNvSpPr txBox="1"/>
+          <p:nvPr/>
+        </p:nvSpPr>
+        <p:spPr>
+          <a:xfrm>
+            <a:off x="5135880" y="228600"/>
+            <a:ext cx="1448424" cy="324615"/>
+          </a:xfrm>
+          <a:prstGeom prst="rect">
+            <a:avLst/>
+          </a:prstGeom>
+          <a:noFill/>
+        </p:spPr>
+        <p:txBody>
+          <a:bodyPr wrap="none" lIns="138596" tIns="69298" rIns="138596" bIns="69298" rtlCol="0">
+            <a:spAutoFit/>
+          </a:bodyPr>
+          <a:lstStyle/>
+          <a:p>
+            <a:pPr algn="r"/>
+            <a:r>
+              <a:rPr lang="en-US" sz="1200" dirty="0" err="1" smtClean="0"/>
+              <a:t>tlsio_dowork</a:t>
+            </a:r>
+            <a:r>
+              <a:rPr lang="en-US" sz="1200" dirty="0" smtClean="0"/>
+              <a:t> </a:t>
+            </a:r>
+            <a:r>
+              <a:rPr lang="en-US" sz="1200" dirty="0"/>
+              <a:t>calls</a:t>
+            </a:r>
+          </a:p>
+        </p:txBody>
+      </p:sp>
+      <p:cxnSp>
+        <p:nvCxnSpPr>
+          <p:cNvPr id="109" name="Curved Connector 108"/>
+          <p:cNvCxnSpPr>
+            <a:cxnSpLocks noChangeAspect="1"/>
+          </p:cNvCxnSpPr>
+          <p:nvPr/>
+        </p:nvCxnSpPr>
+        <p:spPr>
+          <a:xfrm rot="5400000" flipH="1" flipV="1">
+            <a:off x="6929920" y="300520"/>
+            <a:ext cx="191440" cy="274320"/>
+          </a:xfrm>
+          <a:prstGeom prst="curvedConnector2">
+            <a:avLst/>
+          </a:prstGeom>
+          <a:ln w="19050">
+            <a:tailEnd type="triangle"/>
+          </a:ln>
+        </p:spPr>
+        <p:style>
+          <a:lnRef idx="1">
+            <a:schemeClr val="accent1"/>
+          </a:lnRef>
+          <a:fillRef idx="0">
+            <a:schemeClr val="accent1"/>
+          </a:fillRef>
+          <a:effectRef idx="0">
+            <a:schemeClr val="accent1"/>
+          </a:effectRef>
+          <a:fontRef idx="minor">
+            <a:schemeClr val="tx1"/>
+          </a:fontRef>
+        </p:style>
+      </p:cxnSp>
     </p:spTree>
     <p:extLst>
       <p:ext uri="{BB962C8B-B14F-4D97-AF65-F5344CB8AC3E}">

</xml_diff>

<commit_message>
All the doc stuff ACR about state machine
</commit_message>
<xml_diff>
--- a/devdoc/img_src/tlsio_state_diagram.pptx
+++ b/devdoc/img_src/tlsio_state_diagram.pptx
@@ -109,7 +109,7 @@
   </p:defaultTextStyle>
   <p:extLst>
     <p:ext uri="{EFAFB233-063F-42B5-8137-9DF3F51BA10A}">
-      <p15:sldGuideLst xmlns="" xmlns:p15="http://schemas.microsoft.com/office/powerpoint/2012/main">
+      <p15:sldGuideLst xmlns:p15="http://schemas.microsoft.com/office/powerpoint/2012/main" xmlns="">
         <p15:guide id="1" orient="horz" pos="1584">
           <p15:clr>
             <a:srgbClr val="A4A3A4"/>
@@ -208,7 +208,7 @@
           <a:p>
             <a:fld id="{2371847F-0A10-4AA3-BD19-742881361DEA}" type="datetimeFigureOut">
               <a:rPr lang="en-US" smtClean="0"/>
-              <a:t>6/8/2017</a:t>
+              <a:t>6/13/2017</a:t>
             </a:fld>
             <a:endParaRPr lang="en-US"/>
           </a:p>
@@ -738,7 +738,7 @@
           <a:p>
             <a:fld id="{A1593028-A0CA-48C1-B651-1C34254183FB}" type="datetimeFigureOut">
               <a:rPr lang="en-US" smtClean="0"/>
-              <a:t>6/8/2017</a:t>
+              <a:t>6/13/2017</a:t>
             </a:fld>
             <a:endParaRPr lang="en-US"/>
           </a:p>
@@ -906,7 +906,7 @@
           <a:p>
             <a:fld id="{A1593028-A0CA-48C1-B651-1C34254183FB}" type="datetimeFigureOut">
               <a:rPr lang="en-US" smtClean="0"/>
-              <a:t>6/8/2017</a:t>
+              <a:t>6/13/2017</a:t>
             </a:fld>
             <a:endParaRPr lang="en-US"/>
           </a:p>
@@ -1084,7 +1084,7 @@
           <a:p>
             <a:fld id="{A1593028-A0CA-48C1-B651-1C34254183FB}" type="datetimeFigureOut">
               <a:rPr lang="en-US" smtClean="0"/>
-              <a:t>6/8/2017</a:t>
+              <a:t>6/13/2017</a:t>
             </a:fld>
             <a:endParaRPr lang="en-US"/>
           </a:p>
@@ -1252,7 +1252,7 @@
           <a:p>
             <a:fld id="{A1593028-A0CA-48C1-B651-1C34254183FB}" type="datetimeFigureOut">
               <a:rPr lang="en-US" smtClean="0"/>
-              <a:t>6/8/2017</a:t>
+              <a:t>6/13/2017</a:t>
             </a:fld>
             <a:endParaRPr lang="en-US"/>
           </a:p>
@@ -1497,7 +1497,7 @@
           <a:p>
             <a:fld id="{A1593028-A0CA-48C1-B651-1C34254183FB}" type="datetimeFigureOut">
               <a:rPr lang="en-US" smtClean="0"/>
-              <a:t>6/8/2017</a:t>
+              <a:t>6/13/2017</a:t>
             </a:fld>
             <a:endParaRPr lang="en-US"/>
           </a:p>
@@ -1782,7 +1782,7 @@
           <a:p>
             <a:fld id="{A1593028-A0CA-48C1-B651-1C34254183FB}" type="datetimeFigureOut">
               <a:rPr lang="en-US" smtClean="0"/>
-              <a:t>6/8/2017</a:t>
+              <a:t>6/13/2017</a:t>
             </a:fld>
             <a:endParaRPr lang="en-US"/>
           </a:p>
@@ -2206,7 +2206,7 @@
           <a:p>
             <a:fld id="{A1593028-A0CA-48C1-B651-1C34254183FB}" type="datetimeFigureOut">
               <a:rPr lang="en-US" smtClean="0"/>
-              <a:t>6/8/2017</a:t>
+              <a:t>6/13/2017</a:t>
             </a:fld>
             <a:endParaRPr lang="en-US"/>
           </a:p>
@@ -2323,7 +2323,7 @@
           <a:p>
             <a:fld id="{A1593028-A0CA-48C1-B651-1C34254183FB}" type="datetimeFigureOut">
               <a:rPr lang="en-US" smtClean="0"/>
-              <a:t>6/8/2017</a:t>
+              <a:t>6/13/2017</a:t>
             </a:fld>
             <a:endParaRPr lang="en-US"/>
           </a:p>
@@ -2418,7 +2418,7 @@
           <a:p>
             <a:fld id="{A1593028-A0CA-48C1-B651-1C34254183FB}" type="datetimeFigureOut">
               <a:rPr lang="en-US" smtClean="0"/>
-              <a:t>6/8/2017</a:t>
+              <a:t>6/13/2017</a:t>
             </a:fld>
             <a:endParaRPr lang="en-US"/>
           </a:p>
@@ -2693,7 +2693,7 @@
           <a:p>
             <a:fld id="{A1593028-A0CA-48C1-B651-1C34254183FB}" type="datetimeFigureOut">
               <a:rPr lang="en-US" smtClean="0"/>
-              <a:t>6/8/2017</a:t>
+              <a:t>6/13/2017</a:t>
             </a:fld>
             <a:endParaRPr lang="en-US"/>
           </a:p>
@@ -2945,7 +2945,7 @@
           <a:p>
             <a:fld id="{A1593028-A0CA-48C1-B651-1C34254183FB}" type="datetimeFigureOut">
               <a:rPr lang="en-US" smtClean="0"/>
-              <a:t>6/8/2017</a:t>
+              <a:t>6/13/2017</a:t>
             </a:fld>
             <a:endParaRPr lang="en-US"/>
           </a:p>
@@ -3156,7 +3156,7 @@
           <a:p>
             <a:fld id="{A1593028-A0CA-48C1-B651-1C34254183FB}" type="datetimeFigureOut">
               <a:rPr lang="en-US" smtClean="0"/>
-              <a:t>6/8/2017</a:t>
+              <a:t>6/13/2017</a:t>
             </a:fld>
             <a:endParaRPr lang="en-US"/>
           </a:p>
@@ -3858,15 +3858,15 @@
         <p:nvCxnSpPr>
           <p:cNvPr id="129" name="Straight Arrow Connector 128"/>
           <p:cNvCxnSpPr>
-            <a:stCxn id="124" idx="0"/>
+            <a:stCxn id="43" idx="0"/>
             <a:endCxn id="120" idx="2"/>
           </p:cNvCxnSpPr>
           <p:nvPr/>
         </p:nvCxnSpPr>
         <p:spPr>
-          <a:xfrm flipV="1">
+          <a:xfrm flipH="1" flipV="1">
             <a:off x="3941329" y="1600200"/>
-            <a:ext cx="0" cy="990600"/>
+            <a:ext cx="691" cy="429514"/>
           </a:xfrm>
           <a:prstGeom prst="straightConnector1">
             <a:avLst/>
@@ -3894,13 +3894,15 @@
       <p:cxnSp>
         <p:nvCxnSpPr>
           <p:cNvPr id="130" name="Straight Arrow Connector 129"/>
-          <p:cNvCxnSpPr/>
+          <p:cNvCxnSpPr>
+            <a:cxnSpLocks noChangeAspect="1"/>
+          </p:cNvCxnSpPr>
           <p:nvPr/>
         </p:nvCxnSpPr>
         <p:spPr>
           <a:xfrm flipH="1" flipV="1">
-            <a:off x="4330640" y="1533030"/>
-            <a:ext cx="1308161" cy="1052289"/>
+            <a:off x="4330642" y="1533032"/>
+            <a:ext cx="659316" cy="530352"/>
           </a:xfrm>
           <a:prstGeom prst="straightConnector1">
             <a:avLst/>
@@ -4248,13 +4250,15 @@
       <p:cxnSp>
         <p:nvCxnSpPr>
           <p:cNvPr id="202" name="Straight Arrow Connector 201"/>
-          <p:cNvCxnSpPr/>
+          <p:cNvCxnSpPr>
+            <a:stCxn id="2" idx="6"/>
+          </p:cNvCxnSpPr>
           <p:nvPr/>
         </p:nvCxnSpPr>
         <p:spPr>
-          <a:xfrm flipV="1">
-            <a:off x="692442" y="1305790"/>
-            <a:ext cx="2851166" cy="572"/>
+          <a:xfrm>
+            <a:off x="2895600" y="1280160"/>
+            <a:ext cx="648008" cy="0"/>
           </a:xfrm>
           <a:prstGeom prst="straightConnector1">
             <a:avLst/>
@@ -4316,13 +4320,15 @@
       <p:cxnSp>
         <p:nvCxnSpPr>
           <p:cNvPr id="60" name="Straight Arrow Connector 59"/>
-          <p:cNvCxnSpPr/>
+          <p:cNvCxnSpPr>
+            <a:cxnSpLocks noChangeAspect="1"/>
+          </p:cNvCxnSpPr>
           <p:nvPr/>
         </p:nvCxnSpPr>
         <p:spPr>
           <a:xfrm flipH="1" flipV="1">
-            <a:off x="4137397" y="1600200"/>
-            <a:ext cx="1344334" cy="1066800"/>
+            <a:off x="4137399" y="1600200"/>
+            <a:ext cx="576141" cy="457200"/>
           </a:xfrm>
           <a:prstGeom prst="straightConnector1">
             <a:avLst/>
@@ -4891,6 +4897,453 @@
           </a:fontRef>
         </p:style>
       </p:cxnSp>
+      <p:sp>
+        <p:nvSpPr>
+          <p:cNvPr id="2" name="Oval 1"/>
+          <p:cNvSpPr/>
+          <p:nvPr/>
+        </p:nvSpPr>
+        <p:spPr>
+          <a:xfrm>
+            <a:off x="2667000" y="1165860"/>
+            <a:ext cx="228600" cy="228600"/>
+          </a:xfrm>
+          <a:prstGeom prst="ellipse">
+            <a:avLst/>
+          </a:prstGeom>
+          <a:solidFill>
+            <a:schemeClr val="accent1">
+              <a:alpha val="49000"/>
+            </a:schemeClr>
+          </a:solidFill>
+          <a:ln w="19050">
+            <a:solidFill>
+              <a:srgbClr val="4A7EBB"/>
+            </a:solidFill>
+            <a:prstDash val="sysDash"/>
+          </a:ln>
+        </p:spPr>
+        <p:style>
+          <a:lnRef idx="2">
+            <a:schemeClr val="accent1">
+              <a:shade val="50000"/>
+            </a:schemeClr>
+          </a:lnRef>
+          <a:fillRef idx="1">
+            <a:schemeClr val="accent1"/>
+          </a:fillRef>
+          <a:effectRef idx="0">
+            <a:schemeClr val="accent1"/>
+          </a:effectRef>
+          <a:fontRef idx="minor">
+            <a:schemeClr val="lt1"/>
+          </a:fontRef>
+        </p:style>
+        <p:txBody>
+          <a:bodyPr rtlCol="0" anchor="ctr"/>
+          <a:lstStyle/>
+          <a:p>
+            <a:pPr algn="ctr"/>
+            <a:endParaRPr lang="en-US"/>
+          </a:p>
+        </p:txBody>
+      </p:sp>
+      <p:sp>
+        <p:nvSpPr>
+          <p:cNvPr id="39" name="Oval 38"/>
+          <p:cNvSpPr/>
+          <p:nvPr/>
+        </p:nvSpPr>
+        <p:spPr>
+          <a:xfrm>
+            <a:off x="6707942" y="741326"/>
+            <a:ext cx="228600" cy="228600"/>
+          </a:xfrm>
+          <a:prstGeom prst="ellipse">
+            <a:avLst/>
+          </a:prstGeom>
+          <a:solidFill>
+            <a:schemeClr val="accent1">
+              <a:alpha val="49000"/>
+            </a:schemeClr>
+          </a:solidFill>
+          <a:ln w="19050">
+            <a:solidFill>
+              <a:srgbClr val="4A7EBB"/>
+            </a:solidFill>
+            <a:prstDash val="sysDash"/>
+          </a:ln>
+        </p:spPr>
+        <p:style>
+          <a:lnRef idx="2">
+            <a:schemeClr val="accent1">
+              <a:shade val="50000"/>
+            </a:schemeClr>
+          </a:lnRef>
+          <a:fillRef idx="1">
+            <a:schemeClr val="accent1"/>
+          </a:fillRef>
+          <a:effectRef idx="0">
+            <a:schemeClr val="accent1"/>
+          </a:effectRef>
+          <a:fontRef idx="minor">
+            <a:schemeClr val="lt1"/>
+          </a:fontRef>
+        </p:style>
+        <p:txBody>
+          <a:bodyPr rtlCol="0" anchor="ctr"/>
+          <a:lstStyle/>
+          <a:p>
+            <a:pPr algn="ctr"/>
+            <a:endParaRPr lang="en-US"/>
+          </a:p>
+        </p:txBody>
+      </p:sp>
+      <p:sp>
+        <p:nvSpPr>
+          <p:cNvPr id="40" name="TextBox 39"/>
+          <p:cNvSpPr txBox="1"/>
+          <p:nvPr/>
+        </p:nvSpPr>
+        <p:spPr>
+          <a:xfrm>
+            <a:off x="4704154" y="685800"/>
+            <a:ext cx="1849046" cy="324615"/>
+          </a:xfrm>
+          <a:prstGeom prst="rect">
+            <a:avLst/>
+          </a:prstGeom>
+          <a:noFill/>
+        </p:spPr>
+        <p:txBody>
+          <a:bodyPr wrap="none" lIns="138596" tIns="69298" rIns="138596" bIns="69298" rtlCol="0">
+            <a:spAutoFit/>
+          </a:bodyPr>
+          <a:lstStyle/>
+          <a:p>
+            <a:pPr algn="r"/>
+            <a:r>
+              <a:rPr lang="en-US" sz="1200" dirty="0" smtClean="0"/>
+              <a:t>ephemeral</a:t>
+            </a:r>
+            <a:r>
+              <a:rPr lang="en-US" sz="1200" dirty="0" smtClean="0">
+                <a:solidFill>
+                  <a:schemeClr val="tx2">
+                    <a:lumMod val="60000"/>
+                    <a:lumOff val="40000"/>
+                  </a:schemeClr>
+                </a:solidFill>
+              </a:rPr>
+              <a:t> Closing </a:t>
+            </a:r>
+            <a:r>
+              <a:rPr lang="en-US" sz="1200" dirty="0" smtClean="0"/>
+              <a:t>state</a:t>
+            </a:r>
+            <a:endParaRPr lang="en-US" sz="1200" dirty="0"/>
+          </a:p>
+        </p:txBody>
+      </p:sp>
+      <p:sp>
+        <p:nvSpPr>
+          <p:cNvPr id="43" name="Oval 42"/>
+          <p:cNvSpPr/>
+          <p:nvPr/>
+        </p:nvSpPr>
+        <p:spPr>
+          <a:xfrm>
+            <a:off x="3827720" y="2029714"/>
+            <a:ext cx="228600" cy="228600"/>
+          </a:xfrm>
+          <a:prstGeom prst="ellipse">
+            <a:avLst/>
+          </a:prstGeom>
+          <a:solidFill>
+            <a:schemeClr val="accent1">
+              <a:alpha val="49000"/>
+            </a:schemeClr>
+          </a:solidFill>
+          <a:ln w="19050">
+            <a:solidFill>
+              <a:srgbClr val="4A7EBB"/>
+            </a:solidFill>
+            <a:prstDash val="sysDash"/>
+          </a:ln>
+        </p:spPr>
+        <p:style>
+          <a:lnRef idx="2">
+            <a:schemeClr val="accent1">
+              <a:shade val="50000"/>
+            </a:schemeClr>
+          </a:lnRef>
+          <a:fillRef idx="1">
+            <a:schemeClr val="accent1"/>
+          </a:fillRef>
+          <a:effectRef idx="0">
+            <a:schemeClr val="accent1"/>
+          </a:effectRef>
+          <a:fontRef idx="minor">
+            <a:schemeClr val="lt1"/>
+          </a:fontRef>
+        </p:style>
+        <p:txBody>
+          <a:bodyPr rtlCol="0" anchor="ctr"/>
+          <a:lstStyle/>
+          <a:p>
+            <a:pPr algn="ctr"/>
+            <a:endParaRPr lang="en-US"/>
+          </a:p>
+        </p:txBody>
+      </p:sp>
+      <p:cxnSp>
+        <p:nvCxnSpPr>
+          <p:cNvPr id="48" name="Straight Arrow Connector 47"/>
+          <p:cNvCxnSpPr>
+            <a:stCxn id="124" idx="0"/>
+          </p:cNvCxnSpPr>
+          <p:nvPr/>
+        </p:nvCxnSpPr>
+        <p:spPr>
+          <a:xfrm flipH="1" flipV="1">
+            <a:off x="3941328" y="2258314"/>
+            <a:ext cx="1" cy="332486"/>
+          </a:xfrm>
+          <a:prstGeom prst="straightConnector1">
+            <a:avLst/>
+          </a:prstGeom>
+          <a:ln w="19050">
+            <a:prstDash val="sysDash"/>
+            <a:tailEnd type="none"/>
+          </a:ln>
+        </p:spPr>
+        <p:style>
+          <a:lnRef idx="1">
+            <a:schemeClr val="accent1"/>
+          </a:lnRef>
+          <a:fillRef idx="0">
+            <a:schemeClr val="accent1"/>
+          </a:fillRef>
+          <a:effectRef idx="0">
+            <a:schemeClr val="accent1"/>
+          </a:effectRef>
+          <a:fontRef idx="minor">
+            <a:schemeClr val="tx1"/>
+          </a:fontRef>
+        </p:style>
+      </p:cxnSp>
+      <p:cxnSp>
+        <p:nvCxnSpPr>
+          <p:cNvPr id="55" name="Straight Arrow Connector 54"/>
+          <p:cNvCxnSpPr>
+            <a:endCxn id="2" idx="2"/>
+          </p:cNvCxnSpPr>
+          <p:nvPr/>
+        </p:nvCxnSpPr>
+        <p:spPr>
+          <a:xfrm>
+            <a:off x="692442" y="1280160"/>
+            <a:ext cx="1974558" cy="0"/>
+          </a:xfrm>
+          <a:prstGeom prst="straightConnector1">
+            <a:avLst/>
+          </a:prstGeom>
+          <a:ln w="19050">
+            <a:prstDash val="sysDash"/>
+            <a:tailEnd type="none"/>
+          </a:ln>
+        </p:spPr>
+        <p:style>
+          <a:lnRef idx="1">
+            <a:schemeClr val="accent1"/>
+          </a:lnRef>
+          <a:fillRef idx="0">
+            <a:schemeClr val="accent1"/>
+          </a:fillRef>
+          <a:effectRef idx="0">
+            <a:schemeClr val="accent1"/>
+          </a:effectRef>
+          <a:fontRef idx="minor">
+            <a:schemeClr val="tx1"/>
+          </a:fontRef>
+        </p:style>
+      </p:cxnSp>
+      <p:cxnSp>
+        <p:nvCxnSpPr>
+          <p:cNvPr id="64" name="Straight Arrow Connector 63"/>
+          <p:cNvCxnSpPr>
+            <a:cxnSpLocks noChangeAspect="1"/>
+          </p:cNvCxnSpPr>
+          <p:nvPr/>
+        </p:nvCxnSpPr>
+        <p:spPr>
+          <a:xfrm flipH="1" flipV="1">
+            <a:off x="4919472" y="2212152"/>
+            <a:ext cx="562260" cy="446184"/>
+          </a:xfrm>
+          <a:prstGeom prst="straightConnector1">
+            <a:avLst/>
+          </a:prstGeom>
+          <a:ln w="19050">
+            <a:prstDash val="sysDash"/>
+            <a:tailEnd type="none"/>
+          </a:ln>
+        </p:spPr>
+        <p:style>
+          <a:lnRef idx="1">
+            <a:schemeClr val="accent1"/>
+          </a:lnRef>
+          <a:fillRef idx="0">
+            <a:schemeClr val="accent1"/>
+          </a:fillRef>
+          <a:effectRef idx="0">
+            <a:schemeClr val="accent1"/>
+          </a:effectRef>
+          <a:fontRef idx="minor">
+            <a:schemeClr val="tx1"/>
+          </a:fontRef>
+        </p:style>
+      </p:cxnSp>
+      <p:sp>
+        <p:nvSpPr>
+          <p:cNvPr id="67" name="Oval 66"/>
+          <p:cNvSpPr/>
+          <p:nvPr/>
+        </p:nvSpPr>
+        <p:spPr>
+          <a:xfrm>
+            <a:off x="4690872" y="2029968"/>
+            <a:ext cx="228600" cy="228600"/>
+          </a:xfrm>
+          <a:prstGeom prst="ellipse">
+            <a:avLst/>
+          </a:prstGeom>
+          <a:solidFill>
+            <a:schemeClr val="accent1">
+              <a:alpha val="49000"/>
+            </a:schemeClr>
+          </a:solidFill>
+          <a:ln w="19050">
+            <a:solidFill>
+              <a:srgbClr val="4A7EBB"/>
+            </a:solidFill>
+            <a:prstDash val="sysDash"/>
+          </a:ln>
+        </p:spPr>
+        <p:style>
+          <a:lnRef idx="2">
+            <a:schemeClr val="accent1">
+              <a:shade val="50000"/>
+            </a:schemeClr>
+          </a:lnRef>
+          <a:fillRef idx="1">
+            <a:schemeClr val="accent1"/>
+          </a:fillRef>
+          <a:effectRef idx="0">
+            <a:schemeClr val="accent1"/>
+          </a:effectRef>
+          <a:fontRef idx="minor">
+            <a:schemeClr val="lt1"/>
+          </a:fontRef>
+        </p:style>
+        <p:txBody>
+          <a:bodyPr rtlCol="0" anchor="ctr"/>
+          <a:lstStyle/>
+          <a:p>
+            <a:pPr algn="ctr"/>
+            <a:endParaRPr lang="en-US"/>
+          </a:p>
+        </p:txBody>
+      </p:sp>
+      <p:cxnSp>
+        <p:nvCxnSpPr>
+          <p:cNvPr id="68" name="Straight Arrow Connector 67"/>
+          <p:cNvCxnSpPr>
+            <a:cxnSpLocks noChangeAspect="1"/>
+          </p:cNvCxnSpPr>
+          <p:nvPr/>
+        </p:nvCxnSpPr>
+        <p:spPr>
+          <a:xfrm flipH="1" flipV="1">
+            <a:off x="5185516" y="2218592"/>
+            <a:ext cx="443164" cy="356483"/>
+          </a:xfrm>
+          <a:prstGeom prst="straightConnector1">
+            <a:avLst/>
+          </a:prstGeom>
+          <a:ln w="19050">
+            <a:solidFill>
+              <a:srgbClr val="FF0000"/>
+            </a:solidFill>
+            <a:tailEnd type="none"/>
+          </a:ln>
+        </p:spPr>
+        <p:style>
+          <a:lnRef idx="1">
+            <a:schemeClr val="accent1"/>
+          </a:lnRef>
+          <a:fillRef idx="0">
+            <a:schemeClr val="accent1"/>
+          </a:fillRef>
+          <a:effectRef idx="0">
+            <a:schemeClr val="accent1"/>
+          </a:effectRef>
+          <a:fontRef idx="minor">
+            <a:schemeClr val="tx1"/>
+          </a:fontRef>
+        </p:style>
+      </p:cxnSp>
+      <p:sp>
+        <p:nvSpPr>
+          <p:cNvPr id="75" name="Oval 74"/>
+          <p:cNvSpPr/>
+          <p:nvPr/>
+        </p:nvSpPr>
+        <p:spPr>
+          <a:xfrm>
+            <a:off x="4983480" y="2029968"/>
+            <a:ext cx="228600" cy="228600"/>
+          </a:xfrm>
+          <a:prstGeom prst="ellipse">
+            <a:avLst/>
+          </a:prstGeom>
+          <a:solidFill>
+            <a:schemeClr val="accent1">
+              <a:alpha val="49000"/>
+            </a:schemeClr>
+          </a:solidFill>
+          <a:ln w="19050">
+            <a:solidFill>
+              <a:srgbClr val="4A7EBB"/>
+            </a:solidFill>
+            <a:prstDash val="sysDash"/>
+          </a:ln>
+        </p:spPr>
+        <p:style>
+          <a:lnRef idx="2">
+            <a:schemeClr val="accent1">
+              <a:shade val="50000"/>
+            </a:schemeClr>
+          </a:lnRef>
+          <a:fillRef idx="1">
+            <a:schemeClr val="accent1"/>
+          </a:fillRef>
+          <a:effectRef idx="0">
+            <a:schemeClr val="accent1"/>
+          </a:effectRef>
+          <a:fontRef idx="minor">
+            <a:schemeClr val="lt1"/>
+          </a:fontRef>
+        </p:style>
+        <p:txBody>
+          <a:bodyPr rtlCol="0" anchor="ctr"/>
+          <a:lstStyle/>
+          <a:p>
+            <a:pPr algn="ctr"/>
+            <a:endParaRPr lang="en-US"/>
+          </a:p>
+        </p:txBody>
+      </p:sp>
     </p:spTree>
     <p:extLst>
       <p:ext uri="{BB962C8B-B14F-4D97-AF65-F5344CB8AC3E}">
@@ -5478,7 +5931,7 @@
   <a:extraClrSchemeLst/>
   <a:extLst>
     <a:ext uri="{05A4C25C-085E-4340-85A3-A5531E510DB2}">
-      <thm15:themeFamily xmlns="" xmlns:thm15="http://schemas.microsoft.com/office/thememl/2012/main" name="Office Theme" id="{62F939B6-93AF-4DB8-9C6B-D6C7DFDC589F}" vid="{4A3C46E8-61CC-4603-A589-7422A47A8E4A}"/>
+      <thm15:themeFamily xmlns:thm15="http://schemas.microsoft.com/office/thememl/2012/main" xmlns="" name="Office Theme" id="{62F939B6-93AF-4DB8-9C6B-D6C7DFDC589F}" vid="{4A3C46E8-61CC-4603-A589-7422A47A8E4A}"/>
     </a:ext>
   </a:extLst>
 </a:theme>

</xml_diff>